<commit_message>
feat(webapp): ProductCategories page work
</commit_message>
<xml_diff>
--- a/onlab2/presentation.pptx
+++ b/onlab2/presentation.pptx
@@ -209,7 +209,7 @@
           <a:p>
             <a:fld id="{F38CCB3A-395D-4553-8F84-D7E78D3E2CDB}" type="datetimeFigureOut">
               <a:rPr lang="hu-HU" smtClean="0"/>
-              <a:t>2021. 12. 14.</a:t>
+              <a:t>2022. 05. 24.</a:t>
             </a:fld>
             <a:endParaRPr lang="hu-HU"/>
           </a:p>
@@ -1282,7 +1282,7 @@
           <a:p>
             <a:fld id="{1FE1A4FB-7A7A-4315-A84B-D8580DE4DD4B}" type="datetimeFigureOut">
               <a:rPr lang="hu-HU" smtClean="0"/>
-              <a:t>2021. 12. 14.</a:t>
+              <a:t>2022. 05. 24.</a:t>
             </a:fld>
             <a:endParaRPr lang="hu-HU"/>
           </a:p>
@@ -1533,7 +1533,7 @@
           <a:p>
             <a:fld id="{1FE1A4FB-7A7A-4315-A84B-D8580DE4DD4B}" type="datetimeFigureOut">
               <a:rPr lang="hu-HU" smtClean="0"/>
-              <a:t>2021. 12. 14.</a:t>
+              <a:t>2022. 05. 24.</a:t>
             </a:fld>
             <a:endParaRPr lang="hu-HU"/>
           </a:p>
@@ -1847,7 +1847,7 @@
           <a:p>
             <a:fld id="{1FE1A4FB-7A7A-4315-A84B-D8580DE4DD4B}" type="datetimeFigureOut">
               <a:rPr lang="hu-HU" smtClean="0"/>
-              <a:t>2021. 12. 14.</a:t>
+              <a:t>2022. 05. 24.</a:t>
             </a:fld>
             <a:endParaRPr lang="hu-HU"/>
           </a:p>
@@ -2188,7 +2188,7 @@
           <a:p>
             <a:fld id="{1FE1A4FB-7A7A-4315-A84B-D8580DE4DD4B}" type="datetimeFigureOut">
               <a:rPr lang="hu-HU" smtClean="0"/>
-              <a:t>2021. 12. 14.</a:t>
+              <a:t>2022. 05. 24.</a:t>
             </a:fld>
             <a:endParaRPr lang="hu-HU"/>
           </a:p>
@@ -2502,7 +2502,7 @@
           <a:p>
             <a:fld id="{1FE1A4FB-7A7A-4315-A84B-D8580DE4DD4B}" type="datetimeFigureOut">
               <a:rPr lang="hu-HU" smtClean="0"/>
-              <a:t>2021. 12. 14.</a:t>
+              <a:t>2022. 05. 24.</a:t>
             </a:fld>
             <a:endParaRPr lang="hu-HU"/>
           </a:p>
@@ -2895,7 +2895,7 @@
           <a:p>
             <a:fld id="{1FE1A4FB-7A7A-4315-A84B-D8580DE4DD4B}" type="datetimeFigureOut">
               <a:rPr lang="hu-HU" smtClean="0"/>
-              <a:t>2021. 12. 14.</a:t>
+              <a:t>2022. 05. 24.</a:t>
             </a:fld>
             <a:endParaRPr lang="hu-HU"/>
           </a:p>
@@ -3065,7 +3065,7 @@
           <a:p>
             <a:fld id="{1FE1A4FB-7A7A-4315-A84B-D8580DE4DD4B}" type="datetimeFigureOut">
               <a:rPr lang="hu-HU" smtClean="0"/>
-              <a:t>2021. 12. 14.</a:t>
+              <a:t>2022. 05. 24.</a:t>
             </a:fld>
             <a:endParaRPr lang="hu-HU"/>
           </a:p>
@@ -3245,7 +3245,7 @@
           <a:p>
             <a:fld id="{1FE1A4FB-7A7A-4315-A84B-D8580DE4DD4B}" type="datetimeFigureOut">
               <a:rPr lang="hu-HU" smtClean="0"/>
-              <a:t>2021. 12. 14.</a:t>
+              <a:t>2022. 05. 24.</a:t>
             </a:fld>
             <a:endParaRPr lang="hu-HU"/>
           </a:p>
@@ -3421,7 +3421,7 @@
           <a:p>
             <a:fld id="{1FE1A4FB-7A7A-4315-A84B-D8580DE4DD4B}" type="datetimeFigureOut">
               <a:rPr lang="hu-HU" smtClean="0"/>
-              <a:t>2021. 12. 14.</a:t>
+              <a:t>2022. 05. 24.</a:t>
             </a:fld>
             <a:endParaRPr lang="hu-HU"/>
           </a:p>
@@ -3668,7 +3668,7 @@
           <a:p>
             <a:fld id="{1FE1A4FB-7A7A-4315-A84B-D8580DE4DD4B}" type="datetimeFigureOut">
               <a:rPr lang="hu-HU" smtClean="0"/>
-              <a:t>2021. 12. 14.</a:t>
+              <a:t>2022. 05. 24.</a:t>
             </a:fld>
             <a:endParaRPr lang="hu-HU"/>
           </a:p>
@@ -3900,7 +3900,7 @@
           <a:p>
             <a:fld id="{1FE1A4FB-7A7A-4315-A84B-D8580DE4DD4B}" type="datetimeFigureOut">
               <a:rPr lang="hu-HU" smtClean="0"/>
-              <a:t>2021. 12. 14.</a:t>
+              <a:t>2022. 05. 24.</a:t>
             </a:fld>
             <a:endParaRPr lang="hu-HU"/>
           </a:p>
@@ -4274,7 +4274,7 @@
           <a:p>
             <a:fld id="{1FE1A4FB-7A7A-4315-A84B-D8580DE4DD4B}" type="datetimeFigureOut">
               <a:rPr lang="hu-HU" smtClean="0"/>
-              <a:t>2021. 12. 14.</a:t>
+              <a:t>2022. 05. 24.</a:t>
             </a:fld>
             <a:endParaRPr lang="hu-HU"/>
           </a:p>
@@ -4397,7 +4397,7 @@
           <a:p>
             <a:fld id="{1FE1A4FB-7A7A-4315-A84B-D8580DE4DD4B}" type="datetimeFigureOut">
               <a:rPr lang="hu-HU" smtClean="0"/>
-              <a:t>2021. 12. 14.</a:t>
+              <a:t>2022. 05. 24.</a:t>
             </a:fld>
             <a:endParaRPr lang="hu-HU"/>
           </a:p>
@@ -4492,7 +4492,7 @@
           <a:p>
             <a:fld id="{1FE1A4FB-7A7A-4315-A84B-D8580DE4DD4B}" type="datetimeFigureOut">
               <a:rPr lang="hu-HU" smtClean="0"/>
-              <a:t>2021. 12. 14.</a:t>
+              <a:t>2022. 05. 24.</a:t>
             </a:fld>
             <a:endParaRPr lang="hu-HU"/>
           </a:p>
@@ -4747,7 +4747,7 @@
           <a:p>
             <a:fld id="{1FE1A4FB-7A7A-4315-A84B-D8580DE4DD4B}" type="datetimeFigureOut">
               <a:rPr lang="hu-HU" smtClean="0"/>
-              <a:t>2021. 12. 14.</a:t>
+              <a:t>2022. 05. 24.</a:t>
             </a:fld>
             <a:endParaRPr lang="hu-HU"/>
           </a:p>
@@ -5010,7 +5010,7 @@
           <a:p>
             <a:fld id="{1FE1A4FB-7A7A-4315-A84B-D8580DE4DD4B}" type="datetimeFigureOut">
               <a:rPr lang="hu-HU" smtClean="0"/>
-              <a:t>2021. 12. 14.</a:t>
+              <a:t>2022. 05. 24.</a:t>
             </a:fld>
             <a:endParaRPr lang="hu-HU"/>
           </a:p>
@@ -5753,7 +5753,7 @@
           <a:p>
             <a:fld id="{1FE1A4FB-7A7A-4315-A84B-D8580DE4DD4B}" type="datetimeFigureOut">
               <a:rPr lang="hu-HU" smtClean="0"/>
-              <a:t>2021. 12. 14.</a:t>
+              <a:t>2022. 05. 24.</a:t>
             </a:fld>
             <a:endParaRPr lang="hu-HU"/>
           </a:p>
@@ -6293,14 +6293,19 @@
             <p:ph type="ctrTitle"/>
           </p:nvPr>
         </p:nvSpPr>
-        <p:spPr/>
+        <p:spPr>
+          <a:xfrm>
+            <a:off x="1507067" y="1290918"/>
+            <a:ext cx="7766936" cy="2759918"/>
+          </a:xfrm>
+        </p:spPr>
         <p:txBody>
           <a:bodyPr/>
           <a:lstStyle/>
           <a:p>
             <a:r>
-              <a:rPr lang="hu-HU" dirty="0"/>
-              <a:t>Online Webshop</a:t>
+              <a:rPr lang="hu-HU" sz="4400" dirty="0"/>
+              <a:t>WEBSHOP FEJLESZTÉSE WEBES ÉS MOBIL KLIENSRE</a:t>
             </a:r>
           </a:p>
         </p:txBody>
@@ -6556,13 +6561,13 @@
           <a:p>
             <a:r>
               <a:rPr lang="hu-HU" dirty="0"/>
-              <a:t>Felhasználói felület</a:t>
+              <a:t>Mobil kliens</a:t>
             </a:r>
           </a:p>
           <a:p>
             <a:r>
               <a:rPr lang="hu-HU" dirty="0"/>
-              <a:t>Felhasználó kezelés</a:t>
+              <a:t>Webes fizetés</a:t>
             </a:r>
           </a:p>
           <a:p>
@@ -7883,7 +7888,7 @@
           <a:p>
             <a:r>
               <a:rPr lang="hu-HU" dirty="0"/>
-              <a:t>REST API + webes frontend</a:t>
+              <a:t>REST API + webes és mobil frontend</a:t>
             </a:r>
           </a:p>
           <a:p>
@@ -7901,19 +7906,25 @@
           <a:p>
             <a:r>
               <a:rPr lang="hu-HU" dirty="0"/>
-              <a:t>Backend: ASP.NET</a:t>
-            </a:r>
+              <a:t>Backend: ASP.NET </a:t>
+            </a:r>
+            <a:r>
+              <a:rPr lang="hu-HU" dirty="0" err="1"/>
+              <a:t>Core</a:t>
+            </a:r>
+            <a:endParaRPr lang="hu-HU" dirty="0"/>
           </a:p>
           <a:p>
             <a:r>
               <a:rPr lang="hu-HU" dirty="0"/>
-              <a:t>Frontend: </a:t>
-            </a:r>
-            <a:r>
-              <a:rPr lang="hu-HU" dirty="0" err="1"/>
-              <a:t>Angular</a:t>
-            </a:r>
-            <a:endParaRPr lang="hu-HU" dirty="0"/>
+              <a:t>Webes kliens: Angular</a:t>
+            </a:r>
+          </a:p>
+          <a:p>
+            <a:r>
+              <a:rPr lang="hu-HU" dirty="0"/>
+              <a:t>Mobil kliens: Android</a:t>
+            </a:r>
           </a:p>
           <a:p>
             <a:r>
@@ -9010,8 +9021,59 @@
           <a:lstStyle/>
           <a:p>
             <a:r>
+              <a:rPr lang="hu-HU" dirty="0"/>
+              <a:t>Angular + Angular </a:t>
+            </a:r>
+            <a:r>
               <a:rPr lang="hu-HU" dirty="0" err="1"/>
-              <a:t>Angular</a:t>
+              <a:t>Material</a:t>
+            </a:r>
+            <a:r>
+              <a:rPr lang="hu-HU" dirty="0"/>
+              <a:t> + Angular </a:t>
+            </a:r>
+            <a:r>
+              <a:rPr lang="hu-HU" dirty="0" err="1"/>
+              <a:t>Flex</a:t>
+            </a:r>
+            <a:r>
+              <a:rPr lang="hu-HU" dirty="0"/>
+              <a:t> Layout</a:t>
+            </a:r>
+          </a:p>
+          <a:p>
+            <a:r>
+              <a:rPr lang="hu-HU" dirty="0" err="1"/>
+              <a:t>NSwagStudio</a:t>
+            </a:r>
+            <a:endParaRPr lang="hu-HU" dirty="0"/>
+          </a:p>
+          <a:p>
+            <a:r>
+              <a:rPr lang="hu-HU" dirty="0"/>
+              <a:t>Megoldások: </a:t>
+            </a:r>
+          </a:p>
+          <a:p>
+            <a:pPr lvl="1"/>
+            <a:r>
+              <a:rPr lang="hu-HU" dirty="0"/>
+              <a:t>Eseménykezelés</a:t>
+            </a:r>
+          </a:p>
+          <a:p>
+            <a:pPr lvl="1"/>
+            <a:r>
+              <a:rPr lang="hu-HU" dirty="0" err="1"/>
+              <a:t>autentikáció</a:t>
+            </a:r>
+            <a:r>
+              <a:rPr lang="hu-HU" dirty="0"/>
+              <a:t> HTTP </a:t>
+            </a:r>
+            <a:r>
+              <a:rPr lang="hu-HU" dirty="0" err="1"/>
+              <a:t>Interceptorral</a:t>
             </a:r>
             <a:r>
               <a:rPr lang="hu-HU" dirty="0"/>
@@ -9019,58 +9081,7 @@
             </a:r>
             <a:r>
               <a:rPr lang="hu-HU" dirty="0" err="1"/>
-              <a:t>Angular</a:t>
-            </a:r>
-            <a:r>
-              <a:rPr lang="hu-HU" dirty="0"/>
-              <a:t> </a:t>
-            </a:r>
-            <a:r>
-              <a:rPr lang="hu-HU" dirty="0" err="1"/>
-              <a:t>Material</a:t>
-            </a:r>
-            <a:endParaRPr lang="hu-HU" dirty="0"/>
-          </a:p>
-          <a:p>
-            <a:r>
-              <a:rPr lang="hu-HU" dirty="0" err="1"/>
-              <a:t>Bootstrap</a:t>
-            </a:r>
-            <a:endParaRPr lang="hu-HU" dirty="0"/>
-          </a:p>
-          <a:p>
-            <a:r>
-              <a:rPr lang="hu-HU" dirty="0" err="1"/>
-              <a:t>NSwagStudio</a:t>
-            </a:r>
-            <a:endParaRPr lang="hu-HU" dirty="0"/>
-          </a:p>
-          <a:p>
-            <a:r>
-              <a:rPr lang="hu-HU" dirty="0"/>
-              <a:t>Megoldások: </a:t>
-            </a:r>
-          </a:p>
-          <a:p>
-            <a:pPr lvl="1"/>
-            <a:r>
-              <a:rPr lang="hu-HU" dirty="0"/>
-              <a:t>Eseménykezelés</a:t>
-            </a:r>
-          </a:p>
-          <a:p>
-            <a:pPr lvl="1"/>
-            <a:r>
-              <a:rPr lang="hu-HU" dirty="0" err="1"/>
-              <a:t>autentikáció</a:t>
-            </a:r>
-            <a:r>
-              <a:rPr lang="hu-HU" dirty="0"/>
-              <a:t> HTTP </a:t>
-            </a:r>
-            <a:r>
-              <a:rPr lang="hu-HU" dirty="0" err="1"/>
-              <a:t>interceptorral</a:t>
+              <a:t>Guardokkal</a:t>
             </a:r>
             <a:endParaRPr lang="hu-HU" dirty="0"/>
           </a:p>

</xml_diff>